<commit_message>
Una prueba con la interfaz grafica
</commit_message>
<xml_diff>
--- a/Datos/otraPrueba.pptx
+++ b/Datos/otraPrueba.pptx
@@ -6,6 +6,7 @@
   </p:sldMasterIdLst>
   <p:sldIdLst>
     <p:sldId id="256" r:id="rId2"/>
+    <p:sldId id="257" r:id="rId3"/>
   </p:sldIdLst>
   <p:sldSz cx="12192000" cy="6858000"/>
   <p:notesSz cx="6858000" cy="9144000"/>
@@ -3429,6 +3430,101 @@
 </p:sld>
 </file>
 
+<file path=ppt/slides/slide2.xml><?xml version="1.0" encoding="utf-8"?>
+<p:sld xmlns:a="http://schemas.openxmlformats.org/drawingml/2006/main" xmlns:r="http://schemas.openxmlformats.org/officeDocument/2006/relationships" xmlns:p="http://schemas.openxmlformats.org/presentationml/2006/main">
+  <p:cSld>
+    <p:spTree>
+      <p:nvGrpSpPr>
+        <p:cNvPr id="1" name=""/>
+        <p:cNvGrpSpPr/>
+        <p:nvPr/>
+      </p:nvGrpSpPr>
+      <p:grpSpPr>
+        <a:xfrm>
+          <a:off x="0" y="0"/>
+          <a:ext cx="0" cy="0"/>
+          <a:chOff x="0" y="0"/>
+          <a:chExt cx="0" cy="0"/>
+        </a:xfrm>
+      </p:grpSpPr>
+      <p:sp>
+        <p:nvSpPr>
+          <p:cNvPr id="2" name="Título 1">
+            <a:extLst>
+              <a:ext uri="{FF2B5EF4-FFF2-40B4-BE49-F238E27FC236}">
+                <a16:creationId xmlns:a16="http://schemas.microsoft.com/office/drawing/2014/main" id="{F1F570FA-4955-414D-A105-35DC6D7790BE}"/>
+              </a:ext>
+            </a:extLst>
+          </p:cNvPr>
+          <p:cNvSpPr>
+            <a:spLocks noGrp="1"/>
+          </p:cNvSpPr>
+          <p:nvPr>
+            <p:ph type="title"/>
+          </p:nvPr>
+        </p:nvSpPr>
+        <p:spPr/>
+        <p:txBody>
+          <a:bodyPr/>
+          <a:lstStyle/>
+          <a:p>
+            <a:r>
+              <a:rPr lang="en-GB" dirty="0"/>
+              <a:t>Una </a:t>
+            </a:r>
+            <a:r>
+              <a:rPr lang="en-GB" dirty="0" err="1"/>
+              <a:t>nueva</a:t>
+            </a:r>
+            <a:r>
+              <a:rPr lang="en-GB" dirty="0"/>
+              <a:t> </a:t>
+            </a:r>
+            <a:r>
+              <a:rPr lang="en-GB"/>
+              <a:t>diapositiva</a:t>
+            </a:r>
+          </a:p>
+        </p:txBody>
+      </p:sp>
+      <p:sp>
+        <p:nvSpPr>
+          <p:cNvPr id="3" name="Marcador de contenido 2">
+            <a:extLst>
+              <a:ext uri="{FF2B5EF4-FFF2-40B4-BE49-F238E27FC236}">
+                <a16:creationId xmlns:a16="http://schemas.microsoft.com/office/drawing/2014/main" id="{2AE98295-CDD8-4C68-B5B3-38739339C1D6}"/>
+              </a:ext>
+            </a:extLst>
+          </p:cNvPr>
+          <p:cNvSpPr>
+            <a:spLocks noGrp="1"/>
+          </p:cNvSpPr>
+          <p:nvPr>
+            <p:ph idx="1"/>
+          </p:nvPr>
+        </p:nvSpPr>
+        <p:spPr/>
+        <p:txBody>
+          <a:bodyPr/>
+          <a:lstStyle/>
+          <a:p>
+            <a:endParaRPr lang="en-GB"/>
+          </a:p>
+        </p:txBody>
+      </p:sp>
+    </p:spTree>
+    <p:extLst>
+      <p:ext uri="{BB962C8B-B14F-4D97-AF65-F5344CB8AC3E}">
+        <p14:creationId xmlns:p14="http://schemas.microsoft.com/office/powerpoint/2010/main" val="1373602522"/>
+      </p:ext>
+    </p:extLst>
+  </p:cSld>
+  <p:clrMapOvr>
+    <a:masterClrMapping/>
+  </p:clrMapOvr>
+</p:sld>
+</file>
+
 <file path=ppt/theme/theme1.xml><?xml version="1.0" encoding="utf-8"?>
 <a:theme xmlns:a="http://schemas.openxmlformats.org/drawingml/2006/main" name="Tema de Office">
   <a:themeElements>

</xml_diff>

<commit_message>
Le he mostrado a Marta como funciona el GIT
</commit_message>
<xml_diff>
--- a/Datos/otraPrueba.pptx
+++ b/Datos/otraPrueba.pptx
@@ -7,6 +7,7 @@
   <p:sldIdLst>
     <p:sldId id="256" r:id="rId2"/>
     <p:sldId id="257" r:id="rId3"/>
+    <p:sldId id="258" r:id="rId4"/>
   </p:sldIdLst>
   <p:sldSz cx="12192000" cy="6858000"/>
   <p:notesSz cx="6858000" cy="9144000"/>
@@ -3525,6 +3526,93 @@
 </p:sld>
 </file>
 
+<file path=ppt/slides/slide3.xml><?xml version="1.0" encoding="utf-8"?>
+<p:sld xmlns:a="http://schemas.openxmlformats.org/drawingml/2006/main" xmlns:r="http://schemas.openxmlformats.org/officeDocument/2006/relationships" xmlns:p="http://schemas.openxmlformats.org/presentationml/2006/main">
+  <p:cSld>
+    <p:spTree>
+      <p:nvGrpSpPr>
+        <p:cNvPr id="1" name=""/>
+        <p:cNvGrpSpPr/>
+        <p:nvPr/>
+      </p:nvGrpSpPr>
+      <p:grpSpPr>
+        <a:xfrm>
+          <a:off x="0" y="0"/>
+          <a:ext cx="0" cy="0"/>
+          <a:chOff x="0" y="0"/>
+          <a:chExt cx="0" cy="0"/>
+        </a:xfrm>
+      </p:grpSpPr>
+      <p:sp>
+        <p:nvSpPr>
+          <p:cNvPr id="2" name="Título 1">
+            <a:extLst>
+              <a:ext uri="{FF2B5EF4-FFF2-40B4-BE49-F238E27FC236}">
+                <a16:creationId xmlns:a16="http://schemas.microsoft.com/office/drawing/2014/main" id="{278E122C-A67D-4E6C-85FA-16A746374982}"/>
+              </a:ext>
+            </a:extLst>
+          </p:cNvPr>
+          <p:cNvSpPr>
+            <a:spLocks noGrp="1"/>
+          </p:cNvSpPr>
+          <p:nvPr>
+            <p:ph type="title"/>
+          </p:nvPr>
+        </p:nvSpPr>
+        <p:spPr/>
+        <p:txBody>
+          <a:bodyPr/>
+          <a:lstStyle/>
+          <a:p>
+            <a:r>
+              <a:rPr lang="en-GB" dirty="0"/>
+              <a:t>Hola </a:t>
+            </a:r>
+            <a:r>
+              <a:rPr lang="en-GB"/>
+              <a:t>marta</a:t>
+            </a:r>
+          </a:p>
+        </p:txBody>
+      </p:sp>
+      <p:sp>
+        <p:nvSpPr>
+          <p:cNvPr id="3" name="Marcador de contenido 2">
+            <a:extLst>
+              <a:ext uri="{FF2B5EF4-FFF2-40B4-BE49-F238E27FC236}">
+                <a16:creationId xmlns:a16="http://schemas.microsoft.com/office/drawing/2014/main" id="{BCEF43BE-51BA-4EC0-A22E-B93EF93DC13A}"/>
+              </a:ext>
+            </a:extLst>
+          </p:cNvPr>
+          <p:cNvSpPr>
+            <a:spLocks noGrp="1"/>
+          </p:cNvSpPr>
+          <p:nvPr>
+            <p:ph idx="1"/>
+          </p:nvPr>
+        </p:nvSpPr>
+        <p:spPr/>
+        <p:txBody>
+          <a:bodyPr/>
+          <a:lstStyle/>
+          <a:p>
+            <a:endParaRPr lang="en-GB"/>
+          </a:p>
+        </p:txBody>
+      </p:sp>
+    </p:spTree>
+    <p:extLst>
+      <p:ext uri="{BB962C8B-B14F-4D97-AF65-F5344CB8AC3E}">
+        <p14:creationId xmlns:p14="http://schemas.microsoft.com/office/powerpoint/2010/main" val="2751899336"/>
+      </p:ext>
+    </p:extLst>
+  </p:cSld>
+  <p:clrMapOvr>
+    <a:masterClrMapping/>
+  </p:clrMapOvr>
+</p:sld>
+</file>
+
 <file path=ppt/theme/theme1.xml><?xml version="1.0" encoding="utf-8"?>
 <a:theme xmlns:a="http://schemas.openxmlformats.org/drawingml/2006/main" name="Tema de Office">
   <a:themeElements>

</xml_diff>